<commit_message>
Grand ménage des données
</commit_message>
<xml_diff>
--- a/Gestion de projet/Présentation semaine 3.pptx
+++ b/Gestion de projet/Présentation semaine 3.pptx
@@ -7,9 +7,10 @@
   <p:sldIdLst>
     <p:sldId id="256" r:id="rId5"/>
     <p:sldId id="259" r:id="rId6"/>
-    <p:sldId id="262" r:id="rId7"/>
-    <p:sldId id="261" r:id="rId8"/>
-    <p:sldId id="258" r:id="rId9"/>
+    <p:sldId id="261" r:id="rId7"/>
+    <p:sldId id="262" r:id="rId8"/>
+    <p:sldId id="263" r:id="rId9"/>
+    <p:sldId id="258" r:id="rId10"/>
   </p:sldIdLst>
   <p:sldSz cx="12192000" cy="6858000"/>
   <p:notesSz cx="6858000" cy="9144000"/>
@@ -10735,7 +10736,7 @@
         <p:spPr>
           <a:xfrm>
             <a:off x="1404938" y="2311398"/>
-            <a:ext cx="9382124" cy="3939540"/>
+            <a:ext cx="9382124" cy="3693319"/>
           </a:xfrm>
           <a:prstGeom prst="rect">
             <a:avLst/>
@@ -10800,7 +10801,7 @@
             </a:pPr>
             <a:r>
               <a:rPr lang="fr-FR" sz="1600" dirty="0"/>
-              <a:t>Elaboration de la stratégie de qualification des données. Génération de 2 CSV qui prend en compte d’un côté les pilotes et de l’autre les écuries</a:t>
+              <a:t>Elaboration de la stratégie de qualification des données. Génération de 6 CSV</a:t>
             </a:r>
           </a:p>
           <a:p>
@@ -10870,6 +10871,702 @@
 </file>
 
 <file path=ppt/slides/slide3.xml><?xml version="1.0" encoding="utf-8"?>
+<p:sld xmlns:a="http://schemas.openxmlformats.org/drawingml/2006/main" xmlns:r="http://schemas.openxmlformats.org/officeDocument/2006/relationships" xmlns:p="http://schemas.openxmlformats.org/presentationml/2006/main">
+  <p:cSld>
+    <p:spTree>
+      <p:nvGrpSpPr>
+        <p:cNvPr id="1" name=""/>
+        <p:cNvGrpSpPr/>
+        <p:nvPr/>
+      </p:nvGrpSpPr>
+      <p:grpSpPr>
+        <a:xfrm>
+          <a:off x="0" y="0"/>
+          <a:ext cx="0" cy="0"/>
+          <a:chOff x="0" y="0"/>
+          <a:chExt cx="0" cy="0"/>
+        </a:xfrm>
+      </p:grpSpPr>
+      <p:pic>
+        <p:nvPicPr>
+          <p:cNvPr id="4" name="Image 3">
+            <a:extLst>
+              <a:ext uri="{FF2B5EF4-FFF2-40B4-BE49-F238E27FC236}">
+                <a16:creationId xmlns:a16="http://schemas.microsoft.com/office/drawing/2014/main" id="{5654DD66-A7DF-4EB0-B4C4-B3131A34419A}"/>
+              </a:ext>
+            </a:extLst>
+          </p:cNvPr>
+          <p:cNvPicPr>
+            <a:picLocks noChangeAspect="1"/>
+          </p:cNvPicPr>
+          <p:nvPr/>
+        </p:nvPicPr>
+        <p:blipFill>
+          <a:blip r:embed="rId2"/>
+          <a:stretch>
+            <a:fillRect/>
+          </a:stretch>
+        </p:blipFill>
+        <p:spPr>
+          <a:xfrm>
+            <a:off x="835320" y="932734"/>
+            <a:ext cx="1313986" cy="2618973"/>
+          </a:xfrm>
+          <a:prstGeom prst="rect">
+            <a:avLst/>
+          </a:prstGeom>
+        </p:spPr>
+      </p:pic>
+      <p:pic>
+        <p:nvPicPr>
+          <p:cNvPr id="5" name="Image 4">
+            <a:extLst>
+              <a:ext uri="{FF2B5EF4-FFF2-40B4-BE49-F238E27FC236}">
+                <a16:creationId xmlns:a16="http://schemas.microsoft.com/office/drawing/2014/main" id="{9F29C6B9-F33C-4C8B-A620-62C2B240CC28}"/>
+              </a:ext>
+            </a:extLst>
+          </p:cNvPr>
+          <p:cNvPicPr>
+            <a:picLocks noChangeAspect="1"/>
+          </p:cNvPicPr>
+          <p:nvPr/>
+        </p:nvPicPr>
+        <p:blipFill>
+          <a:blip r:embed="rId3"/>
+          <a:stretch>
+            <a:fillRect/>
+          </a:stretch>
+        </p:blipFill>
+        <p:spPr>
+          <a:xfrm>
+            <a:off x="2145062" y="964607"/>
+            <a:ext cx="1313985" cy="2444196"/>
+          </a:xfrm>
+          <a:prstGeom prst="rect">
+            <a:avLst/>
+          </a:prstGeom>
+        </p:spPr>
+      </p:pic>
+      <p:pic>
+        <p:nvPicPr>
+          <p:cNvPr id="6" name="Image 5">
+            <a:extLst>
+              <a:ext uri="{FF2B5EF4-FFF2-40B4-BE49-F238E27FC236}">
+                <a16:creationId xmlns:a16="http://schemas.microsoft.com/office/drawing/2014/main" id="{6390F241-B56B-4577-84B8-56B49573D474}"/>
+              </a:ext>
+            </a:extLst>
+          </p:cNvPr>
+          <p:cNvPicPr>
+            <a:picLocks noChangeAspect="1"/>
+          </p:cNvPicPr>
+          <p:nvPr/>
+        </p:nvPicPr>
+        <p:blipFill>
+          <a:blip r:embed="rId4"/>
+          <a:stretch>
+            <a:fillRect/>
+          </a:stretch>
+        </p:blipFill>
+        <p:spPr>
+          <a:xfrm>
+            <a:off x="7282084" y="4679875"/>
+            <a:ext cx="1948326" cy="1237258"/>
+          </a:xfrm>
+          <a:prstGeom prst="rect">
+            <a:avLst/>
+          </a:prstGeom>
+        </p:spPr>
+      </p:pic>
+      <p:pic>
+        <p:nvPicPr>
+          <p:cNvPr id="7" name="Image 6">
+            <a:extLst>
+              <a:ext uri="{FF2B5EF4-FFF2-40B4-BE49-F238E27FC236}">
+                <a16:creationId xmlns:a16="http://schemas.microsoft.com/office/drawing/2014/main" id="{3398F092-E094-4CFE-AE5A-E6DC52D27213}"/>
+              </a:ext>
+            </a:extLst>
+          </p:cNvPr>
+          <p:cNvPicPr>
+            <a:picLocks noChangeAspect="1"/>
+          </p:cNvPicPr>
+          <p:nvPr/>
+        </p:nvPicPr>
+        <p:blipFill>
+          <a:blip r:embed="rId5"/>
+          <a:stretch>
+            <a:fillRect/>
+          </a:stretch>
+        </p:blipFill>
+        <p:spPr>
+          <a:xfrm>
+            <a:off x="9230410" y="4637763"/>
+            <a:ext cx="1942070" cy="1643290"/>
+          </a:xfrm>
+          <a:prstGeom prst="rect">
+            <a:avLst/>
+          </a:prstGeom>
+        </p:spPr>
+      </p:pic>
+      <p:pic>
+        <p:nvPicPr>
+          <p:cNvPr id="8" name="Image 7">
+            <a:extLst>
+              <a:ext uri="{FF2B5EF4-FFF2-40B4-BE49-F238E27FC236}">
+                <a16:creationId xmlns:a16="http://schemas.microsoft.com/office/drawing/2014/main" id="{A19F3181-33E7-461D-937D-92ED52BDC62F}"/>
+              </a:ext>
+            </a:extLst>
+          </p:cNvPr>
+          <p:cNvPicPr>
+            <a:picLocks noChangeAspect="1"/>
+          </p:cNvPicPr>
+          <p:nvPr/>
+        </p:nvPicPr>
+        <p:blipFill>
+          <a:blip r:embed="rId6"/>
+          <a:stretch>
+            <a:fillRect/>
+          </a:stretch>
+        </p:blipFill>
+        <p:spPr>
+          <a:xfrm>
+            <a:off x="5643948" y="4679875"/>
+            <a:ext cx="1638136" cy="1476869"/>
+          </a:xfrm>
+          <a:prstGeom prst="rect">
+            <a:avLst/>
+          </a:prstGeom>
+        </p:spPr>
+      </p:pic>
+      <p:pic>
+        <p:nvPicPr>
+          <p:cNvPr id="9" name="Image 8">
+            <a:extLst>
+              <a:ext uri="{FF2B5EF4-FFF2-40B4-BE49-F238E27FC236}">
+                <a16:creationId xmlns:a16="http://schemas.microsoft.com/office/drawing/2014/main" id="{A921BF9A-2BFF-4ACC-93E1-5A3DC980FD13}"/>
+              </a:ext>
+            </a:extLst>
+          </p:cNvPr>
+          <p:cNvPicPr>
+            <a:picLocks noChangeAspect="1"/>
+          </p:cNvPicPr>
+          <p:nvPr/>
+        </p:nvPicPr>
+        <p:blipFill>
+          <a:blip r:embed="rId7"/>
+          <a:stretch>
+            <a:fillRect/>
+          </a:stretch>
+        </p:blipFill>
+        <p:spPr>
+          <a:xfrm>
+            <a:off x="695471" y="4315955"/>
+            <a:ext cx="1593683" cy="2415688"/>
+          </a:xfrm>
+          <a:prstGeom prst="rect">
+            <a:avLst/>
+          </a:prstGeom>
+        </p:spPr>
+      </p:pic>
+      <p:pic>
+        <p:nvPicPr>
+          <p:cNvPr id="10" name="Image 9">
+            <a:extLst>
+              <a:ext uri="{FF2B5EF4-FFF2-40B4-BE49-F238E27FC236}">
+                <a16:creationId xmlns:a16="http://schemas.microsoft.com/office/drawing/2014/main" id="{F48F4B06-2D4F-486C-8887-BC2BAAC0A0FB}"/>
+              </a:ext>
+            </a:extLst>
+          </p:cNvPr>
+          <p:cNvPicPr>
+            <a:picLocks noChangeAspect="1"/>
+          </p:cNvPicPr>
+          <p:nvPr/>
+        </p:nvPicPr>
+        <p:blipFill>
+          <a:blip r:embed="rId8"/>
+          <a:stretch>
+            <a:fillRect/>
+          </a:stretch>
+        </p:blipFill>
+        <p:spPr>
+          <a:xfrm>
+            <a:off x="3459047" y="964607"/>
+            <a:ext cx="1571682" cy="2714724"/>
+          </a:xfrm>
+          <a:prstGeom prst="rect">
+            <a:avLst/>
+          </a:prstGeom>
+        </p:spPr>
+      </p:pic>
+      <p:pic>
+        <p:nvPicPr>
+          <p:cNvPr id="11" name="Image 10">
+            <a:extLst>
+              <a:ext uri="{FF2B5EF4-FFF2-40B4-BE49-F238E27FC236}">
+                <a16:creationId xmlns:a16="http://schemas.microsoft.com/office/drawing/2014/main" id="{9A6822B0-5740-4BA9-9A91-D797996D2C9E}"/>
+              </a:ext>
+            </a:extLst>
+          </p:cNvPr>
+          <p:cNvPicPr>
+            <a:picLocks noChangeAspect="1"/>
+          </p:cNvPicPr>
+          <p:nvPr/>
+        </p:nvPicPr>
+        <p:blipFill>
+          <a:blip r:embed="rId9"/>
+          <a:stretch>
+            <a:fillRect/>
+          </a:stretch>
+        </p:blipFill>
+        <p:spPr>
+          <a:xfrm>
+            <a:off x="2308126" y="4679875"/>
+            <a:ext cx="2068367" cy="1746122"/>
+          </a:xfrm>
+          <a:prstGeom prst="rect">
+            <a:avLst/>
+          </a:prstGeom>
+        </p:spPr>
+      </p:pic>
+      <p:pic>
+        <p:nvPicPr>
+          <p:cNvPr id="12" name="Image 11">
+            <a:extLst>
+              <a:ext uri="{FF2B5EF4-FFF2-40B4-BE49-F238E27FC236}">
+                <a16:creationId xmlns:a16="http://schemas.microsoft.com/office/drawing/2014/main" id="{462833A1-7EEA-416C-B92F-FDF932342019}"/>
+              </a:ext>
+            </a:extLst>
+          </p:cNvPr>
+          <p:cNvPicPr>
+            <a:picLocks noChangeAspect="1"/>
+          </p:cNvPicPr>
+          <p:nvPr/>
+        </p:nvPicPr>
+        <p:blipFill>
+          <a:blip r:embed="rId10"/>
+          <a:stretch>
+            <a:fillRect/>
+          </a:stretch>
+        </p:blipFill>
+        <p:spPr>
+          <a:xfrm>
+            <a:off x="5061803" y="932734"/>
+            <a:ext cx="1229222" cy="735861"/>
+          </a:xfrm>
+          <a:prstGeom prst="rect">
+            <a:avLst/>
+          </a:prstGeom>
+        </p:spPr>
+      </p:pic>
+      <p:pic>
+        <p:nvPicPr>
+          <p:cNvPr id="13" name="Image 12">
+            <a:extLst>
+              <a:ext uri="{FF2B5EF4-FFF2-40B4-BE49-F238E27FC236}">
+                <a16:creationId xmlns:a16="http://schemas.microsoft.com/office/drawing/2014/main" id="{7497A41B-EC0F-45AE-BA26-6E9E1F469664}"/>
+              </a:ext>
+            </a:extLst>
+          </p:cNvPr>
+          <p:cNvPicPr>
+            <a:picLocks noChangeAspect="1"/>
+          </p:cNvPicPr>
+          <p:nvPr/>
+        </p:nvPicPr>
+        <p:blipFill>
+          <a:blip r:embed="rId11"/>
+          <a:stretch>
+            <a:fillRect/>
+          </a:stretch>
+        </p:blipFill>
+        <p:spPr>
+          <a:xfrm>
+            <a:off x="8165851" y="576947"/>
+            <a:ext cx="1653850" cy="1791671"/>
+          </a:xfrm>
+          <a:prstGeom prst="rect">
+            <a:avLst/>
+          </a:prstGeom>
+        </p:spPr>
+      </p:pic>
+      <p:pic>
+        <p:nvPicPr>
+          <p:cNvPr id="14" name="Image 13">
+            <a:extLst>
+              <a:ext uri="{FF2B5EF4-FFF2-40B4-BE49-F238E27FC236}">
+                <a16:creationId xmlns:a16="http://schemas.microsoft.com/office/drawing/2014/main" id="{FF54575D-77B8-4E66-A99E-DDB623FB966F}"/>
+              </a:ext>
+            </a:extLst>
+          </p:cNvPr>
+          <p:cNvPicPr>
+            <a:picLocks noChangeAspect="1"/>
+          </p:cNvPicPr>
+          <p:nvPr/>
+        </p:nvPicPr>
+        <p:blipFill>
+          <a:blip r:embed="rId12"/>
+          <a:stretch>
+            <a:fillRect/>
+          </a:stretch>
+        </p:blipFill>
+        <p:spPr>
+          <a:xfrm>
+            <a:off x="6359134" y="1778005"/>
+            <a:ext cx="1615513" cy="1967075"/>
+          </a:xfrm>
+          <a:prstGeom prst="rect">
+            <a:avLst/>
+          </a:prstGeom>
+        </p:spPr>
+      </p:pic>
+      <p:pic>
+        <p:nvPicPr>
+          <p:cNvPr id="15" name="Image 14">
+            <a:extLst>
+              <a:ext uri="{FF2B5EF4-FFF2-40B4-BE49-F238E27FC236}">
+                <a16:creationId xmlns:a16="http://schemas.microsoft.com/office/drawing/2014/main" id="{7155ACE1-83FB-4D92-B283-14E492DA0B89}"/>
+              </a:ext>
+            </a:extLst>
+          </p:cNvPr>
+          <p:cNvPicPr>
+            <a:picLocks noChangeAspect="1"/>
+          </p:cNvPicPr>
+          <p:nvPr/>
+        </p:nvPicPr>
+        <p:blipFill>
+          <a:blip r:embed="rId13"/>
+          <a:stretch>
+            <a:fillRect/>
+          </a:stretch>
+        </p:blipFill>
+        <p:spPr>
+          <a:xfrm>
+            <a:off x="10187474" y="1363984"/>
+            <a:ext cx="1615513" cy="2444196"/>
+          </a:xfrm>
+          <a:prstGeom prst="rect">
+            <a:avLst/>
+          </a:prstGeom>
+        </p:spPr>
+      </p:pic>
+      <p:sp>
+        <p:nvSpPr>
+          <p:cNvPr id="2" name="Ellipse 1">
+            <a:extLst>
+              <a:ext uri="{FF2B5EF4-FFF2-40B4-BE49-F238E27FC236}">
+                <a16:creationId xmlns:a16="http://schemas.microsoft.com/office/drawing/2014/main" id="{3BC97E69-7C50-498C-B888-16423296FF9B}"/>
+              </a:ext>
+            </a:extLst>
+          </p:cNvPr>
+          <p:cNvSpPr/>
+          <p:nvPr/>
+        </p:nvSpPr>
+        <p:spPr>
+          <a:xfrm>
+            <a:off x="533400" y="304801"/>
+            <a:ext cx="5562600" cy="3440280"/>
+          </a:xfrm>
+          <a:prstGeom prst="ellipse">
+            <a:avLst/>
+          </a:prstGeom>
+          <a:solidFill>
+            <a:srgbClr val="3FB96C">
+              <a:alpha val="40000"/>
+            </a:srgbClr>
+          </a:solidFill>
+        </p:spPr>
+        <p:style>
+          <a:lnRef idx="2">
+            <a:schemeClr val="accent1">
+              <a:shade val="50000"/>
+            </a:schemeClr>
+          </a:lnRef>
+          <a:fillRef idx="1">
+            <a:schemeClr val="accent1"/>
+          </a:fillRef>
+          <a:effectRef idx="0">
+            <a:schemeClr val="accent1"/>
+          </a:effectRef>
+          <a:fontRef idx="minor">
+            <a:schemeClr val="lt1"/>
+          </a:fontRef>
+        </p:style>
+        <p:txBody>
+          <a:bodyPr rtlCol="0" anchor="ctr"/>
+          <a:lstStyle/>
+          <a:p>
+            <a:pPr algn="ctr"/>
+            <a:endParaRPr lang="fr-FR"/>
+          </a:p>
+        </p:txBody>
+      </p:sp>
+      <p:sp>
+        <p:nvSpPr>
+          <p:cNvPr id="3" name="Ellipse 2">
+            <a:extLst>
+              <a:ext uri="{FF2B5EF4-FFF2-40B4-BE49-F238E27FC236}">
+                <a16:creationId xmlns:a16="http://schemas.microsoft.com/office/drawing/2014/main" id="{8D99DE89-686C-4AFA-9B9B-9D267982A14A}"/>
+              </a:ext>
+            </a:extLst>
+          </p:cNvPr>
+          <p:cNvSpPr/>
+          <p:nvPr/>
+        </p:nvSpPr>
+        <p:spPr>
+          <a:xfrm>
+            <a:off x="5903399" y="4098745"/>
+            <a:ext cx="4705695" cy="2718623"/>
+          </a:xfrm>
+          <a:prstGeom prst="ellipse">
+            <a:avLst/>
+          </a:prstGeom>
+          <a:solidFill>
+            <a:srgbClr val="3FB96C">
+              <a:alpha val="40000"/>
+            </a:srgbClr>
+          </a:solidFill>
+        </p:spPr>
+        <p:style>
+          <a:lnRef idx="2">
+            <a:schemeClr val="accent1">
+              <a:shade val="50000"/>
+            </a:schemeClr>
+          </a:lnRef>
+          <a:fillRef idx="1">
+            <a:schemeClr val="accent1"/>
+          </a:fillRef>
+          <a:effectRef idx="0">
+            <a:schemeClr val="accent1"/>
+          </a:effectRef>
+          <a:fontRef idx="minor">
+            <a:schemeClr val="lt1"/>
+          </a:fontRef>
+        </p:style>
+        <p:txBody>
+          <a:bodyPr rtlCol="0" anchor="ctr"/>
+          <a:lstStyle/>
+          <a:p>
+            <a:pPr algn="ctr"/>
+            <a:endParaRPr lang="fr-FR"/>
+          </a:p>
+        </p:txBody>
+      </p:sp>
+      <p:sp>
+        <p:nvSpPr>
+          <p:cNvPr id="18" name="Ellipse 17">
+            <a:extLst>
+              <a:ext uri="{FF2B5EF4-FFF2-40B4-BE49-F238E27FC236}">
+                <a16:creationId xmlns:a16="http://schemas.microsoft.com/office/drawing/2014/main" id="{E9288074-22F8-4B08-A230-C38DF577F294}"/>
+              </a:ext>
+            </a:extLst>
+          </p:cNvPr>
+          <p:cNvSpPr/>
+          <p:nvPr/>
+        </p:nvSpPr>
+        <p:spPr>
+          <a:xfrm>
+            <a:off x="452747" y="4541650"/>
+            <a:ext cx="4071968" cy="1986074"/>
+          </a:xfrm>
+          <a:prstGeom prst="ellipse">
+            <a:avLst/>
+          </a:prstGeom>
+          <a:solidFill>
+            <a:srgbClr val="3FB96C">
+              <a:alpha val="40000"/>
+            </a:srgbClr>
+          </a:solidFill>
+        </p:spPr>
+        <p:style>
+          <a:lnRef idx="2">
+            <a:schemeClr val="accent1">
+              <a:shade val="50000"/>
+            </a:schemeClr>
+          </a:lnRef>
+          <a:fillRef idx="1">
+            <a:schemeClr val="accent1"/>
+          </a:fillRef>
+          <a:effectRef idx="0">
+            <a:schemeClr val="accent1"/>
+          </a:effectRef>
+          <a:fontRef idx="minor">
+            <a:schemeClr val="lt1"/>
+          </a:fontRef>
+        </p:style>
+        <p:txBody>
+          <a:bodyPr rtlCol="0" anchor="ctr"/>
+          <a:lstStyle/>
+          <a:p>
+            <a:pPr algn="ctr"/>
+            <a:endParaRPr lang="fr-FR"/>
+          </a:p>
+        </p:txBody>
+      </p:sp>
+      <p:sp>
+        <p:nvSpPr>
+          <p:cNvPr id="20" name="Ellipse 19">
+            <a:extLst>
+              <a:ext uri="{FF2B5EF4-FFF2-40B4-BE49-F238E27FC236}">
+                <a16:creationId xmlns:a16="http://schemas.microsoft.com/office/drawing/2014/main" id="{5C24611F-A941-4E67-B685-23B326FCCCEC}"/>
+              </a:ext>
+            </a:extLst>
+          </p:cNvPr>
+          <p:cNvSpPr/>
+          <p:nvPr/>
+        </p:nvSpPr>
+        <p:spPr>
+          <a:xfrm>
+            <a:off x="6008143" y="2206475"/>
+            <a:ext cx="2157708" cy="1601705"/>
+          </a:xfrm>
+          <a:prstGeom prst="ellipse">
+            <a:avLst/>
+          </a:prstGeom>
+          <a:solidFill>
+            <a:srgbClr val="3FB96C">
+              <a:alpha val="40000"/>
+            </a:srgbClr>
+          </a:solidFill>
+        </p:spPr>
+        <p:style>
+          <a:lnRef idx="2">
+            <a:schemeClr val="accent1">
+              <a:shade val="50000"/>
+            </a:schemeClr>
+          </a:lnRef>
+          <a:fillRef idx="1">
+            <a:schemeClr val="accent1"/>
+          </a:fillRef>
+          <a:effectRef idx="0">
+            <a:schemeClr val="accent1"/>
+          </a:effectRef>
+          <a:fontRef idx="minor">
+            <a:schemeClr val="lt1"/>
+          </a:fontRef>
+        </p:style>
+        <p:txBody>
+          <a:bodyPr rtlCol="0" anchor="ctr"/>
+          <a:lstStyle/>
+          <a:p>
+            <a:pPr algn="ctr"/>
+            <a:endParaRPr lang="fr-FR"/>
+          </a:p>
+        </p:txBody>
+      </p:sp>
+      <p:sp>
+        <p:nvSpPr>
+          <p:cNvPr id="22" name="Ellipse 21">
+            <a:extLst>
+              <a:ext uri="{FF2B5EF4-FFF2-40B4-BE49-F238E27FC236}">
+                <a16:creationId xmlns:a16="http://schemas.microsoft.com/office/drawing/2014/main" id="{7EBD0064-0F42-4896-B5C9-A75B5103F8BF}"/>
+              </a:ext>
+            </a:extLst>
+          </p:cNvPr>
+          <p:cNvSpPr/>
+          <p:nvPr/>
+        </p:nvSpPr>
+        <p:spPr>
+          <a:xfrm>
+            <a:off x="7953998" y="640515"/>
+            <a:ext cx="2157708" cy="1601705"/>
+          </a:xfrm>
+          <a:prstGeom prst="ellipse">
+            <a:avLst/>
+          </a:prstGeom>
+          <a:solidFill>
+            <a:srgbClr val="3FB96C">
+              <a:alpha val="40000"/>
+            </a:srgbClr>
+          </a:solidFill>
+        </p:spPr>
+        <p:style>
+          <a:lnRef idx="2">
+            <a:schemeClr val="accent1">
+              <a:shade val="50000"/>
+            </a:schemeClr>
+          </a:lnRef>
+          <a:fillRef idx="1">
+            <a:schemeClr val="accent1"/>
+          </a:fillRef>
+          <a:effectRef idx="0">
+            <a:schemeClr val="accent1"/>
+          </a:effectRef>
+          <a:fontRef idx="minor">
+            <a:schemeClr val="lt1"/>
+          </a:fontRef>
+        </p:style>
+        <p:txBody>
+          <a:bodyPr rtlCol="0" anchor="ctr"/>
+          <a:lstStyle/>
+          <a:p>
+            <a:pPr algn="ctr"/>
+            <a:endParaRPr lang="fr-FR"/>
+          </a:p>
+        </p:txBody>
+      </p:sp>
+      <p:sp>
+        <p:nvSpPr>
+          <p:cNvPr id="24" name="Ellipse 23">
+            <a:extLst>
+              <a:ext uri="{FF2B5EF4-FFF2-40B4-BE49-F238E27FC236}">
+                <a16:creationId xmlns:a16="http://schemas.microsoft.com/office/drawing/2014/main" id="{2C2AA8D2-1D07-492C-A263-41FA3905081A}"/>
+              </a:ext>
+            </a:extLst>
+          </p:cNvPr>
+          <p:cNvSpPr/>
+          <p:nvPr/>
+        </p:nvSpPr>
+        <p:spPr>
+          <a:xfrm>
+            <a:off x="9828824" y="2173235"/>
+            <a:ext cx="2157708" cy="1601705"/>
+          </a:xfrm>
+          <a:prstGeom prst="ellipse">
+            <a:avLst/>
+          </a:prstGeom>
+          <a:solidFill>
+            <a:srgbClr val="3FB96C">
+              <a:alpha val="40000"/>
+            </a:srgbClr>
+          </a:solidFill>
+        </p:spPr>
+        <p:style>
+          <a:lnRef idx="2">
+            <a:schemeClr val="accent1">
+              <a:shade val="50000"/>
+            </a:schemeClr>
+          </a:lnRef>
+          <a:fillRef idx="1">
+            <a:schemeClr val="accent1"/>
+          </a:fillRef>
+          <a:effectRef idx="0">
+            <a:schemeClr val="accent1"/>
+          </a:effectRef>
+          <a:fontRef idx="minor">
+            <a:schemeClr val="lt1"/>
+          </a:fontRef>
+        </p:style>
+        <p:txBody>
+          <a:bodyPr rtlCol="0" anchor="ctr"/>
+          <a:lstStyle/>
+          <a:p>
+            <a:pPr algn="ctr"/>
+            <a:endParaRPr lang="fr-FR"/>
+          </a:p>
+        </p:txBody>
+      </p:sp>
+    </p:spTree>
+    <p:extLst>
+      <p:ext uri="{BB962C8B-B14F-4D97-AF65-F5344CB8AC3E}">
+        <p14:creationId xmlns:p14="http://schemas.microsoft.com/office/powerpoint/2010/main" val="1276586304"/>
+      </p:ext>
+    </p:extLst>
+  </p:cSld>
+  <p:clrMapOvr>
+    <a:masterClrMapping/>
+  </p:clrMapOvr>
+</p:sld>
+</file>
+
+<file path=ppt/slides/slide4.xml><?xml version="1.0" encoding="utf-8"?>
 <p:sld xmlns:a="http://schemas.openxmlformats.org/drawingml/2006/main" xmlns:r="http://schemas.openxmlformats.org/officeDocument/2006/relationships" xmlns:p="http://schemas.openxmlformats.org/presentationml/2006/main">
   <p:cSld>
     <p:spTree>
@@ -11062,7 +11759,7 @@
 </p:sld>
 </file>
 
-<file path=ppt/slides/slide4.xml><?xml version="1.0" encoding="utf-8"?>
+<file path=ppt/slides/slide5.xml><?xml version="1.0" encoding="utf-8"?>
 <p:sld xmlns:a="http://schemas.openxmlformats.org/drawingml/2006/main" xmlns:r="http://schemas.openxmlformats.org/officeDocument/2006/relationships" xmlns:p="http://schemas.openxmlformats.org/presentationml/2006/main">
   <p:cSld>
     <p:spTree>
@@ -11079,370 +11776,43 @@
           <a:chExt cx="0" cy="0"/>
         </a:xfrm>
       </p:grpSpPr>
-      <p:pic>
-        <p:nvPicPr>
-          <p:cNvPr id="4" name="Image 3">
+      <p:sp>
+        <p:nvSpPr>
+          <p:cNvPr id="2" name="Titre 1">
             <a:extLst>
               <a:ext uri="{FF2B5EF4-FFF2-40B4-BE49-F238E27FC236}">
-                <a16:creationId xmlns:a16="http://schemas.microsoft.com/office/drawing/2014/main" id="{5654DD66-A7DF-4EB0-B4C4-B3131A34419A}"/>
+                <a16:creationId xmlns:a16="http://schemas.microsoft.com/office/drawing/2014/main" id="{8F34A48A-531A-4041-A230-2221D5543B71}"/>
               </a:ext>
             </a:extLst>
           </p:cNvPr>
-          <p:cNvPicPr>
-            <a:picLocks noChangeAspect="1"/>
-          </p:cNvPicPr>
-          <p:nvPr/>
-        </p:nvPicPr>
-        <p:blipFill>
-          <a:blip r:embed="rId2"/>
-          <a:stretch>
-            <a:fillRect/>
-          </a:stretch>
-        </p:blipFill>
+          <p:cNvSpPr>
+            <a:spLocks noGrp="1"/>
+          </p:cNvSpPr>
+          <p:nvPr>
+            <p:ph type="title"/>
+          </p:nvPr>
+        </p:nvSpPr>
         <p:spPr>
           <a:xfrm>
-            <a:off x="835320" y="932734"/>
-            <a:ext cx="1313986" cy="2618973"/>
+            <a:off x="3519487" y="3005137"/>
+            <a:ext cx="5153025" cy="847725"/>
           </a:xfrm>
-          <a:prstGeom prst="rect">
-            <a:avLst/>
-          </a:prstGeom>
         </p:spPr>
-      </p:pic>
-      <p:pic>
-        <p:nvPicPr>
-          <p:cNvPr id="5" name="Image 4">
-            <a:extLst>
-              <a:ext uri="{FF2B5EF4-FFF2-40B4-BE49-F238E27FC236}">
-                <a16:creationId xmlns:a16="http://schemas.microsoft.com/office/drawing/2014/main" id="{9F29C6B9-F33C-4C8B-A620-62C2B240CC28}"/>
-              </a:ext>
-            </a:extLst>
-          </p:cNvPr>
-          <p:cNvPicPr>
-            <a:picLocks noChangeAspect="1"/>
-          </p:cNvPicPr>
-          <p:nvPr/>
-        </p:nvPicPr>
-        <p:blipFill>
-          <a:blip r:embed="rId3"/>
-          <a:stretch>
-            <a:fillRect/>
-          </a:stretch>
-        </p:blipFill>
-        <p:spPr>
-          <a:xfrm>
-            <a:off x="2339447" y="1107511"/>
-            <a:ext cx="1313985" cy="2444196"/>
-          </a:xfrm>
-          <a:prstGeom prst="rect">
-            <a:avLst/>
-          </a:prstGeom>
-        </p:spPr>
-      </p:pic>
-      <p:pic>
-        <p:nvPicPr>
-          <p:cNvPr id="6" name="Image 5">
-            <a:extLst>
-              <a:ext uri="{FF2B5EF4-FFF2-40B4-BE49-F238E27FC236}">
-                <a16:creationId xmlns:a16="http://schemas.microsoft.com/office/drawing/2014/main" id="{6390F241-B56B-4577-84B8-56B49573D474}"/>
-              </a:ext>
-            </a:extLst>
-          </p:cNvPr>
-          <p:cNvPicPr>
-            <a:picLocks noChangeAspect="1"/>
-          </p:cNvPicPr>
-          <p:nvPr/>
-        </p:nvPicPr>
-        <p:blipFill>
-          <a:blip r:embed="rId4"/>
-          <a:stretch>
-            <a:fillRect/>
-          </a:stretch>
-        </p:blipFill>
-        <p:spPr>
-          <a:xfrm>
-            <a:off x="6526237" y="3868754"/>
-            <a:ext cx="1948326" cy="1237258"/>
-          </a:xfrm>
-          <a:prstGeom prst="rect">
-            <a:avLst/>
-          </a:prstGeom>
-        </p:spPr>
-      </p:pic>
-      <p:pic>
-        <p:nvPicPr>
-          <p:cNvPr id="7" name="Image 6">
-            <a:extLst>
-              <a:ext uri="{FF2B5EF4-FFF2-40B4-BE49-F238E27FC236}">
-                <a16:creationId xmlns:a16="http://schemas.microsoft.com/office/drawing/2014/main" id="{3398F092-E094-4CFE-AE5A-E6DC52D27213}"/>
-              </a:ext>
-            </a:extLst>
-          </p:cNvPr>
-          <p:cNvPicPr>
-            <a:picLocks noChangeAspect="1"/>
-          </p:cNvPicPr>
-          <p:nvPr/>
-        </p:nvPicPr>
-        <p:blipFill>
-          <a:blip r:embed="rId5"/>
-          <a:stretch>
-            <a:fillRect/>
-          </a:stretch>
-        </p:blipFill>
-        <p:spPr>
-          <a:xfrm>
-            <a:off x="9885997" y="3808653"/>
-            <a:ext cx="1942070" cy="1643290"/>
-          </a:xfrm>
-          <a:prstGeom prst="rect">
-            <a:avLst/>
-          </a:prstGeom>
-        </p:spPr>
-      </p:pic>
-      <p:pic>
-        <p:nvPicPr>
-          <p:cNvPr id="8" name="Image 7">
-            <a:extLst>
-              <a:ext uri="{FF2B5EF4-FFF2-40B4-BE49-F238E27FC236}">
-                <a16:creationId xmlns:a16="http://schemas.microsoft.com/office/drawing/2014/main" id="{A19F3181-33E7-461D-937D-92ED52BDC62F}"/>
-              </a:ext>
-            </a:extLst>
-          </p:cNvPr>
-          <p:cNvPicPr>
-            <a:picLocks noChangeAspect="1"/>
-          </p:cNvPicPr>
-          <p:nvPr/>
-        </p:nvPicPr>
-        <p:blipFill>
-          <a:blip r:embed="rId6"/>
-          <a:stretch>
-            <a:fillRect/>
-          </a:stretch>
-        </p:blipFill>
-        <p:spPr>
-          <a:xfrm>
-            <a:off x="4747296" y="3891864"/>
-            <a:ext cx="1638136" cy="1476869"/>
-          </a:xfrm>
-          <a:prstGeom prst="rect">
-            <a:avLst/>
-          </a:prstGeom>
-        </p:spPr>
-      </p:pic>
-      <p:pic>
-        <p:nvPicPr>
-          <p:cNvPr id="9" name="Image 8">
-            <a:extLst>
-              <a:ext uri="{FF2B5EF4-FFF2-40B4-BE49-F238E27FC236}">
-                <a16:creationId xmlns:a16="http://schemas.microsoft.com/office/drawing/2014/main" id="{A921BF9A-2BFF-4ACC-93E1-5A3DC980FD13}"/>
-              </a:ext>
-            </a:extLst>
-          </p:cNvPr>
-          <p:cNvPicPr>
-            <a:picLocks noChangeAspect="1"/>
-          </p:cNvPicPr>
-          <p:nvPr/>
-        </p:nvPicPr>
-        <p:blipFill>
-          <a:blip r:embed="rId7"/>
-          <a:stretch>
-            <a:fillRect/>
-          </a:stretch>
-        </p:blipFill>
-        <p:spPr>
-          <a:xfrm>
-            <a:off x="753726" y="3764702"/>
-            <a:ext cx="1593683" cy="2415688"/>
-          </a:xfrm>
-          <a:prstGeom prst="rect">
-            <a:avLst/>
-          </a:prstGeom>
-        </p:spPr>
-      </p:pic>
-      <p:pic>
-        <p:nvPicPr>
-          <p:cNvPr id="10" name="Image 9">
-            <a:extLst>
-              <a:ext uri="{FF2B5EF4-FFF2-40B4-BE49-F238E27FC236}">
-                <a16:creationId xmlns:a16="http://schemas.microsoft.com/office/drawing/2014/main" id="{F48F4B06-2D4F-486C-8887-BC2BAAC0A0FB}"/>
-              </a:ext>
-            </a:extLst>
-          </p:cNvPr>
-          <p:cNvPicPr>
-            <a:picLocks noChangeAspect="1"/>
-          </p:cNvPicPr>
-          <p:nvPr/>
-        </p:nvPicPr>
-        <p:blipFill>
-          <a:blip r:embed="rId8"/>
-          <a:stretch>
-            <a:fillRect/>
-          </a:stretch>
-        </p:blipFill>
-        <p:spPr>
-          <a:xfrm>
-            <a:off x="9066712" y="714276"/>
-            <a:ext cx="1571682" cy="2714724"/>
-          </a:xfrm>
-          <a:prstGeom prst="rect">
-            <a:avLst/>
-          </a:prstGeom>
-        </p:spPr>
-      </p:pic>
-      <p:pic>
-        <p:nvPicPr>
-          <p:cNvPr id="11" name="Image 10">
-            <a:extLst>
-              <a:ext uri="{FF2B5EF4-FFF2-40B4-BE49-F238E27FC236}">
-                <a16:creationId xmlns:a16="http://schemas.microsoft.com/office/drawing/2014/main" id="{9A6822B0-5740-4BA9-9A91-D797996D2C9E}"/>
-              </a:ext>
-            </a:extLst>
-          </p:cNvPr>
-          <p:cNvPicPr>
-            <a:picLocks noChangeAspect="1"/>
-          </p:cNvPicPr>
-          <p:nvPr/>
-        </p:nvPicPr>
-        <p:blipFill>
-          <a:blip r:embed="rId9"/>
-          <a:stretch>
-            <a:fillRect/>
-          </a:stretch>
-        </p:blipFill>
-        <p:spPr>
-          <a:xfrm>
-            <a:off x="2489374" y="3845053"/>
-            <a:ext cx="2068367" cy="1746122"/>
-          </a:xfrm>
-          <a:prstGeom prst="rect">
-            <a:avLst/>
-          </a:prstGeom>
-        </p:spPr>
-      </p:pic>
-      <p:pic>
-        <p:nvPicPr>
-          <p:cNvPr id="12" name="Image 11">
-            <a:extLst>
-              <a:ext uri="{FF2B5EF4-FFF2-40B4-BE49-F238E27FC236}">
-                <a16:creationId xmlns:a16="http://schemas.microsoft.com/office/drawing/2014/main" id="{462833A1-7EEA-416C-B92F-FDF932342019}"/>
-              </a:ext>
-            </a:extLst>
-          </p:cNvPr>
-          <p:cNvPicPr>
-            <a:picLocks noChangeAspect="1"/>
-          </p:cNvPicPr>
-          <p:nvPr/>
-        </p:nvPicPr>
-        <p:blipFill>
-          <a:blip r:embed="rId10"/>
-          <a:stretch>
-            <a:fillRect/>
-          </a:stretch>
-        </p:blipFill>
-        <p:spPr>
-          <a:xfrm>
-            <a:off x="8565669" y="3894437"/>
-            <a:ext cx="1229222" cy="735861"/>
-          </a:xfrm>
-          <a:prstGeom prst="rect">
-            <a:avLst/>
-          </a:prstGeom>
-        </p:spPr>
-      </p:pic>
-      <p:pic>
-        <p:nvPicPr>
-          <p:cNvPr id="13" name="Image 12">
-            <a:extLst>
-              <a:ext uri="{FF2B5EF4-FFF2-40B4-BE49-F238E27FC236}">
-                <a16:creationId xmlns:a16="http://schemas.microsoft.com/office/drawing/2014/main" id="{7497A41B-EC0F-45AE-BA26-6E9E1F469664}"/>
-              </a:ext>
-            </a:extLst>
-          </p:cNvPr>
-          <p:cNvPicPr>
-            <a:picLocks noChangeAspect="1"/>
-          </p:cNvPicPr>
-          <p:nvPr/>
-        </p:nvPicPr>
-        <p:blipFill>
-          <a:blip r:embed="rId11"/>
-          <a:stretch>
-            <a:fillRect/>
-          </a:stretch>
-        </p:blipFill>
-        <p:spPr>
-          <a:xfrm>
-            <a:off x="7229215" y="1593581"/>
-            <a:ext cx="1653850" cy="1791671"/>
-          </a:xfrm>
-          <a:prstGeom prst="rect">
-            <a:avLst/>
-          </a:prstGeom>
-        </p:spPr>
-      </p:pic>
-      <p:pic>
-        <p:nvPicPr>
-          <p:cNvPr id="14" name="Image 13">
-            <a:extLst>
-              <a:ext uri="{FF2B5EF4-FFF2-40B4-BE49-F238E27FC236}">
-                <a16:creationId xmlns:a16="http://schemas.microsoft.com/office/drawing/2014/main" id="{FF54575D-77B8-4E66-A99E-DDB623FB966F}"/>
-              </a:ext>
-            </a:extLst>
-          </p:cNvPr>
-          <p:cNvPicPr>
-            <a:picLocks noChangeAspect="1"/>
-          </p:cNvPicPr>
-          <p:nvPr/>
-        </p:nvPicPr>
-        <p:blipFill>
-          <a:blip r:embed="rId12"/>
-          <a:stretch>
-            <a:fillRect/>
-          </a:stretch>
-        </p:blipFill>
-        <p:spPr>
-          <a:xfrm>
-            <a:off x="5498783" y="1505880"/>
-            <a:ext cx="1615513" cy="1967075"/>
-          </a:xfrm>
-          <a:prstGeom prst="rect">
-            <a:avLst/>
-          </a:prstGeom>
-        </p:spPr>
-      </p:pic>
-      <p:pic>
-        <p:nvPicPr>
-          <p:cNvPr id="15" name="Image 14">
-            <a:extLst>
-              <a:ext uri="{FF2B5EF4-FFF2-40B4-BE49-F238E27FC236}">
-                <a16:creationId xmlns:a16="http://schemas.microsoft.com/office/drawing/2014/main" id="{7155ACE1-83FB-4D92-B283-14E492DA0B89}"/>
-              </a:ext>
-            </a:extLst>
-          </p:cNvPr>
-          <p:cNvPicPr>
-            <a:picLocks noChangeAspect="1"/>
-          </p:cNvPicPr>
-          <p:nvPr/>
-        </p:nvPicPr>
-        <p:blipFill>
-          <a:blip r:embed="rId13"/>
-          <a:stretch>
-            <a:fillRect/>
-          </a:stretch>
-        </p:blipFill>
-        <p:spPr>
-          <a:xfrm>
-            <a:off x="3768351" y="1099871"/>
-            <a:ext cx="1615513" cy="2444196"/>
-          </a:xfrm>
-          <a:prstGeom prst="rect">
-            <a:avLst/>
-          </a:prstGeom>
-        </p:spPr>
-      </p:pic>
+        <p:txBody>
+          <a:bodyPr/>
+          <a:lstStyle/>
+          <a:p>
+            <a:r>
+              <a:rPr lang="fr-FR" dirty="0"/>
+              <a:t>Analyse prédictive</a:t>
+            </a:r>
+          </a:p>
+        </p:txBody>
+      </p:sp>
     </p:spTree>
     <p:extLst>
       <p:ext uri="{BB962C8B-B14F-4D97-AF65-F5344CB8AC3E}">
-        <p14:creationId xmlns:p14="http://schemas.microsoft.com/office/powerpoint/2010/main" val="1276586304"/>
+        <p14:creationId xmlns:p14="http://schemas.microsoft.com/office/powerpoint/2010/main" val="2077493828"/>
       </p:ext>
     </p:extLst>
   </p:cSld>
@@ -11452,7 +11822,7 @@
 </p:sld>
 </file>
 
-<file path=ppt/slides/slide5.xml><?xml version="1.0" encoding="utf-8"?>
+<file path=ppt/slides/slide6.xml><?xml version="1.0" encoding="utf-8"?>
 <p:sld xmlns:a="http://schemas.openxmlformats.org/drawingml/2006/main" xmlns:r="http://schemas.openxmlformats.org/officeDocument/2006/relationships" xmlns:p="http://schemas.openxmlformats.org/presentationml/2006/main">
   <p:cSld>
     <p:spTree>
@@ -11575,8 +11945,13 @@
             </a:pPr>
             <a:r>
               <a:rPr lang="fr-FR" sz="1600" dirty="0"/>
-              <a:t>Elaboration de la base de données et réflexion sur le rafraichissement de celle-ci</a:t>
+              <a:t>Elaboration de la base de données et réflexion sur le rafraichissement de celle-ci. </a:t>
             </a:r>
+            <a:r>
+              <a:rPr lang="fr-FR" sz="1600"/>
+              <a:t>Réalisation du MCD</a:t>
+            </a:r>
+            <a:endParaRPr lang="fr-FR" sz="1600" dirty="0"/>
           </a:p>
           <a:p>
             <a:pPr marL="285750" indent="-285750">

</xml_diff>